<commit_message>
multiple answer and titles included. Templating fixed,
</commit_message>
<xml_diff>
--- a/CaseStudy.pptx
+++ b/CaseStudy.pptx
@@ -570,178 +570,6 @@
 </p:sldLayout>
 </file>
 
-<file path=ppt/slideLayouts/slideLayout2.xml><?xml version="1.0" encoding="utf-8"?>
-<p:sldLayout xmlns:a="http://schemas.openxmlformats.org/drawingml/2006/main" xmlns:r="http://schemas.openxmlformats.org/officeDocument/2006/relationships" xmlns:p="http://schemas.openxmlformats.org/presentationml/2006/main" preserve="1">
-  <p:cSld name="MASTER_SLIDE">
-    <p:bg>
-      <p:bgPr>
-        <a:solidFill>
-          <a:srgbClr val="FFFFFF"/>
-        </a:solidFill>
-        <a:effectLst/>
-      </p:bgPr>
-    </p:bg>
-    <p:spTree>
-      <p:nvGrpSpPr>
-        <p:cNvPr id="1" name=""/>
-        <p:cNvGrpSpPr/>
-        <p:nvPr/>
-      </p:nvGrpSpPr>
-      <p:grpSpPr>
-        <a:xfrm>
-          <a:off x="0" y="0"/>
-          <a:ext cx="0" cy="0"/>
-          <a:chOff x="0" y="0"/>
-          <a:chExt cx="0" cy="0"/>
-        </a:xfrm>
-      </p:grpSpPr>
-      <p:sp>
-        <p:nvSpPr>
-          <p:cNvPr id="2" name="Object 1"/>
-          <p:cNvSpPr/>
-          <p:nvPr/>
-        </p:nvSpPr>
-        <p:spPr>
-          <a:xfrm>
-            <a:off x="3200400" y="914400"/>
-            <a:ext cx="5486400" cy="914400"/>
-          </a:xfrm>
-          <a:prstGeom prst="line">
-            <a:avLst/>
-          </a:prstGeom>
-          <a:noFill/>
-          <a:ln w="63500">
-            <a:solidFill>
-              <a:srgbClr val="0088CC"/>
-            </a:solidFill>
-            <a:prstDash val="solid"/>
-          </a:ln>
-        </p:spPr>
-      </p:sp>
-      <p:sp>
-        <p:nvSpPr>
-          <p:cNvPr id="3" name="Object 2"/>
-          <p:cNvSpPr/>
-          <p:nvPr/>
-        </p:nvSpPr>
-        <p:spPr>
-          <a:xfrm>
-            <a:off x="0" y="4846320"/>
-            <a:ext cx="9144000" cy="685800"/>
-          </a:xfrm>
-          <a:prstGeom prst="rect">
-            <a:avLst/>
-          </a:prstGeom>
-          <a:solidFill>
-            <a:srgbClr val="F1F1F1"/>
-          </a:solidFill>
-        </p:spPr>
-      </p:sp>
-      <p:sp>
-        <p:nvSpPr>
-          <p:cNvPr id="4" name="Object 3"/>
-          <p:cNvSpPr/>
-          <p:nvPr/>
-        </p:nvSpPr>
-        <p:spPr>
-          <a:xfrm>
-            <a:off x="2743200" y="4846320"/>
-            <a:ext cx="5029200" cy="685800"/>
-          </a:xfrm>
-          <a:prstGeom prst="rect">
-            <a:avLst/>
-          </a:prstGeom>
-          <a:noFill/>
-        </p:spPr>
-        <p:txBody>
-          <a:bodyPr wrap="square" rtlCol="0" anchor="ctr"/>
-          <a:lstStyle/>
-          <a:p>
-            <a:pPr>
-              <a:buNone/>
-            </a:pPr>
-            <a:r>
-              <a:rPr lang="en-US" dirty="0" smtClean="0">
-                <a:solidFill>
-                  <a:srgbClr val="000000"/>
-                </a:solidFill>
-              </a:rPr>
-              <a:t>Status Report</a:t>
-            </a:r>
-            <a:endParaRPr lang="en-US" dirty="0"/>
-          </a:p>
-        </p:txBody>
-      </p:sp>
-      <p:pic>
-        <p:nvPicPr>
-          <p:cNvPr id="5" name="Object 4" descr="images/logo.png">    </p:cNvPr>
-          <p:cNvPicPr>
-            <a:picLocks noChangeAspect="1"/>
-          </p:cNvPicPr>
-          <p:nvPr/>
-        </p:nvPicPr>
-        <p:blipFill>
-          <a:blip r:embed="rId1"/>
-          <a:stretch>
-            <a:fillRect/>
-          </a:stretch>
-        </p:blipFill>
-        <p:spPr>
-          <a:xfrm>
-            <a:off x="10332720" y="5852160"/>
-            <a:ext cx="1527048" cy="685800"/>
-          </a:xfrm>
-          <a:prstGeom prst="rect">
-            <a:avLst/>
-          </a:prstGeom>
-        </p:spPr>
-      </p:pic>
-      <p:sp>
-        <p:nvSpPr>
-          <p:cNvPr id="25" name="Slide Number Placeholder 24"/>
-          <p:cNvSpPr>
-            <a:spLocks noGrp="1"/>
-          </p:cNvSpPr>
-          <p:nvPr>
-            <p:ph type="sldNum" sz="quarter" idx="4294967295"/>
-          </p:nvPr>
-        </p:nvSpPr>
-        <p:spPr>
-          <a:xfrm>
-            <a:off x="274320" y="4629150"/>
-            <a:ext cx="800000" cy="300000"/>
-          </a:xfrm>
-          <a:prstGeom prst="rect">
-            <a:avLst/>
-          </a:prstGeom>
-          <a:extLst>
-            <a:ext uri="{C572A759-6A51-4108-AA02-DFA0A04FC94B}">
-              <ma14:wrappingTextBoxFlag xmlns:ma14="http://schemas.microsoft.com/office/mac/drawingml/2011/main" val="0"/>
-            </a:ext>
-          </a:extLst>
-        </p:spPr>
-        <p:txBody>
-          <a:bodyPr/>
-          <a:lstStyle>
-            <a:lvl1pPr/>
-          </a:lstStyle>
-          <a:p>
-            <a:fld id="{F7021451-1387-4CA6-816F-3879F97B5CBC}" type="slidenum">
-              <a:rPr lang="en-US" smtClean="0"/>
-              <a:t/>
-            </a:fld>
-            <a:endParaRPr lang="en-US"/>
-          </a:p>
-        </p:txBody>
-      </p:sp>
-    </p:spTree>
-  </p:cSld>
-  <p:clrMapOvr>
-    <a:masterClrMapping/>
-  </p:clrMapOvr>
-</p:sldLayout>
-</file>
-
 <file path=ppt/slideMasters/slideMaster1.xml><?xml version="1.0" encoding="utf-8"?>
 <p:sldMaster xmlns:a="http://schemas.openxmlformats.org/drawingml/2006/main" xmlns:r="http://schemas.openxmlformats.org/officeDocument/2006/relationships" xmlns:p="http://schemas.openxmlformats.org/presentationml/2006/main">
   <p:cSld>
@@ -759,50 +587,11 @@
           <a:chExt cx="0" cy="0"/>
         </a:xfrm>
       </p:grpSpPr>
-      <p:sp>
-        <p:nvSpPr>
-          <p:cNvPr id="25" name="Slide Number Placeholder 24"/>
-          <p:cNvSpPr>
-            <a:spLocks noGrp="1"/>
-          </p:cNvSpPr>
-          <p:nvPr>
-            <p:ph type="sldNum" sz="quarter" idx="4294967295"/>
-          </p:nvPr>
-        </p:nvSpPr>
-        <p:spPr>
-          <a:xfrm>
-            <a:off x="274320" y="4629150"/>
-            <a:ext cx="800000" cy="300000"/>
-          </a:xfrm>
-          <a:prstGeom prst="rect">
-            <a:avLst/>
-          </a:prstGeom>
-          <a:extLst>
-            <a:ext uri="{C572A759-6A51-4108-AA02-DFA0A04FC94B}">
-              <ma14:wrappingTextBoxFlag xmlns:ma14="http://schemas.microsoft.com/office/mac/drawingml/2011/main" val="0"/>
-            </a:ext>
-          </a:extLst>
-        </p:spPr>
-        <p:txBody>
-          <a:bodyPr/>
-          <a:lstStyle>
-            <a:lvl1pPr/>
-          </a:lstStyle>
-          <a:p>
-            <a:fld id="{F7021451-1387-4CA6-816F-3879F97B5CBC}" type="slidenum">
-              <a:rPr lang="en-US" smtClean="0"/>
-              <a:t/>
-            </a:fld>
-            <a:endParaRPr lang="en-US"/>
-          </a:p>
-        </p:txBody>
-      </p:sp>
     </p:spTree>
   </p:cSld>
   <p:clrMap bg1="lt1" tx1="dk1" bg2="lt2" tx2="dk2" accent1="accent1" accent2="accent2" accent3="accent3" accent4="accent4" accent5="accent5" accent6="accent6" hlink="hlink" folHlink="folHlink"/>
   <p:sldLayoutIdLst>
     <p:sldLayoutId id="2147483649" r:id="rId1"/>
-    <p:sldLayoutId id="2147483650" r:id="rId2"/>
   </p:sldLayoutIdLst>
   <p:hf sldNum="0" hdr="0" ftr="0" dt="0"/>
   <p:txStyles>
@@ -1083,8 +872,8 @@
         </p:nvSpPr>
         <p:spPr>
           <a:xfrm>
-            <a:off x="914400" y="914400"/>
-            <a:ext cx="6858000" cy="274320"/>
+            <a:off x="182880" y="0"/>
+            <a:ext cx="8961120" cy="274320"/>
           </a:xfrm>
           <a:prstGeom prst="rect">
             <a:avLst/>
@@ -1092,19 +881,389 @@
           <a:noFill/>
         </p:spPr>
         <p:txBody>
-          <a:bodyPr wrap="square" rtlCol="0" anchor="ctr"/>
+          <a:bodyPr wrap="square" rtlCol="0" anchor="t"/>
           <a:lstStyle/>
           <a:p>
             <a:pPr>
               <a:buNone/>
             </a:pPr>
             <a:r>
-              <a:rPr lang="en-US" sz="4200" dirty="0" smtClean="0">
+              <a:rPr lang="en-US" b="1" sz="1200" dirty="0" smtClean="0">
                 <a:solidFill>
-                  <a:srgbClr val="00FF00"/>
+                  <a:srgbClr val="000000"/>
                 </a:solidFill>
               </a:rPr>
-              <a:t>123</a:t>
+              <a:t>sadssadsad</a:t>
+            </a:r>
+            <a:endParaRPr lang="en-US" dirty="0"/>
+          </a:p>
+        </p:txBody>
+      </p:sp>
+      <p:sp>
+        <p:nvSpPr>
+          <p:cNvPr id="3" name="Object 2"/>
+          <p:cNvSpPr/>
+          <p:nvPr/>
+        </p:nvSpPr>
+        <p:spPr>
+          <a:xfrm>
+            <a:off x="182880" y="457200"/>
+            <a:ext cx="4389120" cy="274320"/>
+          </a:xfrm>
+          <a:prstGeom prst="rect">
+            <a:avLst/>
+          </a:prstGeom>
+          <a:noFill/>
+        </p:spPr>
+        <p:txBody>
+          <a:bodyPr wrap="square" rtlCol="0" anchor="t">
+            <a:spAutoFit/>
+          </a:bodyPr>
+          <a:lstStyle/>
+          <a:p>
+            <a:pPr>
+              <a:buNone/>
+            </a:pPr>
+            <a:r>
+              <a:rPr lang="en-US" sz="800" dirty="0" smtClean="0">
+                <a:solidFill>
+                  <a:srgbClr val="000000"/>
+                </a:solidFill>
+              </a:rPr>
+              <a:t>Lorem ipsum dolor sit amet, iudico doming cum an, nemore posidonium constituam cu vis. Mea ei hinc nemore?</a:t>
+            </a:r>
+            <a:endParaRPr lang="en-US" dirty="0"/>
+          </a:p>
+        </p:txBody>
+      </p:sp>
+      <p:sp>
+        <p:nvSpPr>
+          <p:cNvPr id="4" name="Object 3"/>
+          <p:cNvSpPr/>
+          <p:nvPr/>
+        </p:nvSpPr>
+        <p:spPr>
+          <a:xfrm>
+            <a:off x="182880" y="731520"/>
+            <a:ext cx="4389120" cy="274320"/>
+          </a:xfrm>
+          <a:prstGeom prst="rect">
+            <a:avLst/>
+          </a:prstGeom>
+          <a:noFill/>
+        </p:spPr>
+        <p:txBody>
+          <a:bodyPr wrap="square" rtlCol="0" anchor="t">
+            <a:spAutoFit/>
+          </a:bodyPr>
+          <a:lstStyle/>
+          <a:p>
+            <a:pPr>
+              <a:buNone/>
+            </a:pPr>
+            <a:r>
+              <a:rPr lang="en-US" sz="800" dirty="0" smtClean="0">
+                <a:solidFill>
+                  <a:srgbClr val="000000"/>
+                </a:solidFill>
+              </a:rPr>
+              <a:t>asadsad</a:t>
+            </a:r>
+            <a:endParaRPr lang="en-US" dirty="0"/>
+          </a:p>
+        </p:txBody>
+      </p:sp>
+      <p:sp>
+        <p:nvSpPr>
+          <p:cNvPr id="5" name="Object 4"/>
+          <p:cNvSpPr/>
+          <p:nvPr/>
+        </p:nvSpPr>
+        <p:spPr>
+          <a:xfrm>
+            <a:off x="182880" y="1828800"/>
+            <a:ext cx="4389120" cy="274320"/>
+          </a:xfrm>
+          <a:prstGeom prst="rect">
+            <a:avLst/>
+          </a:prstGeom>
+          <a:noFill/>
+        </p:spPr>
+        <p:txBody>
+          <a:bodyPr wrap="square" rtlCol="0" anchor="t">
+            <a:spAutoFit/>
+          </a:bodyPr>
+          <a:lstStyle/>
+          <a:p>
+            <a:pPr>
+              <a:buNone/>
+            </a:pPr>
+            <a:r>
+              <a:rPr lang="en-US" sz="800" dirty="0" smtClean="0">
+                <a:solidFill>
+                  <a:srgbClr val="000000"/>
+                </a:solidFill>
+              </a:rPr>
+              <a:t>Lorem ipsum dolor sit amet, iudico doming cum an, nemore posidonium constituam cu vis. Mea ei hinc nemore?</a:t>
+            </a:r>
+            <a:endParaRPr lang="en-US" dirty="0"/>
+          </a:p>
+        </p:txBody>
+      </p:sp>
+      <p:sp>
+        <p:nvSpPr>
+          <p:cNvPr id="6" name="Object 5"/>
+          <p:cNvSpPr/>
+          <p:nvPr/>
+        </p:nvSpPr>
+        <p:spPr>
+          <a:xfrm>
+            <a:off x="182880" y="2103120"/>
+            <a:ext cx="4389120" cy="274320"/>
+          </a:xfrm>
+          <a:prstGeom prst="rect">
+            <a:avLst/>
+          </a:prstGeom>
+          <a:noFill/>
+        </p:spPr>
+        <p:txBody>
+          <a:bodyPr wrap="square" rtlCol="0" anchor="t">
+            <a:spAutoFit/>
+          </a:bodyPr>
+          <a:lstStyle/>
+          <a:p>
+            <a:pPr>
+              <a:buNone/>
+            </a:pPr>
+            <a:r>
+              <a:rPr lang="en-US" sz="800" dirty="0" smtClean="0">
+                <a:solidFill>
+                  <a:srgbClr val="000000"/>
+                </a:solidFill>
+              </a:rPr>
+              <a:t>sadsadsa</a:t>
+            </a:r>
+            <a:endParaRPr lang="en-US" dirty="0"/>
+          </a:p>
+        </p:txBody>
+      </p:sp>
+      <p:sp>
+        <p:nvSpPr>
+          <p:cNvPr id="7" name="Object 6"/>
+          <p:cNvSpPr/>
+          <p:nvPr/>
+        </p:nvSpPr>
+        <p:spPr>
+          <a:xfrm>
+            <a:off x="182880" y="2743200"/>
+            <a:ext cx="4389120" cy="274320"/>
+          </a:xfrm>
+          <a:prstGeom prst="rect">
+            <a:avLst/>
+          </a:prstGeom>
+          <a:noFill/>
+        </p:spPr>
+        <p:txBody>
+          <a:bodyPr wrap="square" rtlCol="0" anchor="t">
+            <a:spAutoFit/>
+          </a:bodyPr>
+          <a:lstStyle/>
+          <a:p>
+            <a:pPr>
+              <a:buNone/>
+            </a:pPr>
+            <a:r>
+              <a:rPr lang="en-US" sz="800" dirty="0" smtClean="0">
+                <a:solidFill>
+                  <a:srgbClr val="000000"/>
+                </a:solidFill>
+              </a:rPr>
+              <a:t>Lorem ipsum dolor sit amet, iudico doming cum an, nemore posidonium constituam cu vis. Mea ei hinc nemore?</a:t>
+            </a:r>
+            <a:endParaRPr lang="en-US" dirty="0"/>
+          </a:p>
+        </p:txBody>
+      </p:sp>
+      <p:sp>
+        <p:nvSpPr>
+          <p:cNvPr id="8" name="Object 7"/>
+          <p:cNvSpPr/>
+          <p:nvPr/>
+        </p:nvSpPr>
+        <p:spPr>
+          <a:xfrm>
+            <a:off x="182880" y="3017520"/>
+            <a:ext cx="4389120" cy="274320"/>
+          </a:xfrm>
+          <a:prstGeom prst="rect">
+            <a:avLst/>
+          </a:prstGeom>
+          <a:noFill/>
+        </p:spPr>
+        <p:txBody>
+          <a:bodyPr wrap="square" rtlCol="0" anchor="t">
+            <a:spAutoFit/>
+          </a:bodyPr>
+          <a:lstStyle/>
+          <a:p>
+            <a:pPr>
+              <a:buNone/>
+            </a:pPr>
+            <a:r>
+              <a:rPr lang="en-US" sz="800" dirty="0" smtClean="0">
+                <a:solidFill>
+                  <a:srgbClr val="000000"/>
+                </a:solidFill>
+              </a:rPr>
+              <a:t>dsads</a:t>
+            </a:r>
+            <a:endParaRPr lang="en-US" dirty="0"/>
+          </a:p>
+        </p:txBody>
+      </p:sp>
+      <p:sp>
+        <p:nvSpPr>
+          <p:cNvPr id="9" name="Object 8"/>
+          <p:cNvSpPr/>
+          <p:nvPr/>
+        </p:nvSpPr>
+        <p:spPr>
+          <a:xfrm>
+            <a:off x="4572000" y="457200"/>
+            <a:ext cx="4389120" cy="274320"/>
+          </a:xfrm>
+          <a:prstGeom prst="rect">
+            <a:avLst/>
+          </a:prstGeom>
+          <a:noFill/>
+        </p:spPr>
+        <p:txBody>
+          <a:bodyPr wrap="square" rtlCol="0" anchor="t">
+            <a:spAutoFit/>
+          </a:bodyPr>
+          <a:lstStyle/>
+          <a:p>
+            <a:pPr>
+              <a:buNone/>
+            </a:pPr>
+            <a:r>
+              <a:rPr lang="en-US" sz="800" dirty="0" smtClean="0">
+                <a:solidFill>
+                  <a:srgbClr val="000000"/>
+                </a:solidFill>
+              </a:rPr>
+              <a:t>Lorem ipsum dolor sit amet, iudico doming cum an, nemore posidonium constituam cu vis. Mea ei hinc nemore?</a:t>
+            </a:r>
+            <a:endParaRPr lang="en-US" dirty="0"/>
+          </a:p>
+        </p:txBody>
+      </p:sp>
+      <p:sp>
+        <p:nvSpPr>
+          <p:cNvPr id="10" name="Object 9"/>
+          <p:cNvSpPr/>
+          <p:nvPr/>
+        </p:nvSpPr>
+        <p:spPr>
+          <a:xfrm>
+            <a:off x="4572000" y="731520"/>
+            <a:ext cx="4389120" cy="274320"/>
+          </a:xfrm>
+          <a:prstGeom prst="rect">
+            <a:avLst/>
+          </a:prstGeom>
+          <a:noFill/>
+        </p:spPr>
+        <p:txBody>
+          <a:bodyPr wrap="square" rtlCol="0" anchor="t">
+            <a:spAutoFit/>
+          </a:bodyPr>
+          <a:lstStyle/>
+          <a:p>
+            <a:pPr>
+              <a:buNone/>
+            </a:pPr>
+            <a:r>
+              <a:rPr lang="en-US" sz="800" dirty="0" smtClean="0">
+                <a:solidFill>
+                  <a:srgbClr val="000000"/>
+                </a:solidFill>
+              </a:rPr>
+              <a:t>dsadsa</a:t>
+            </a:r>
+            <a:endParaRPr lang="en-US" dirty="0"/>
+          </a:p>
+        </p:txBody>
+      </p:sp>
+      <p:sp>
+        <p:nvSpPr>
+          <p:cNvPr id="11" name="Object 10"/>
+          <p:cNvSpPr/>
+          <p:nvPr/>
+        </p:nvSpPr>
+        <p:spPr>
+          <a:xfrm>
+            <a:off x="4572000" y="2743200"/>
+            <a:ext cx="4389120" cy="274320"/>
+          </a:xfrm>
+          <a:prstGeom prst="rect">
+            <a:avLst/>
+          </a:prstGeom>
+          <a:noFill/>
+        </p:spPr>
+        <p:txBody>
+          <a:bodyPr wrap="square" rtlCol="0" anchor="t">
+            <a:spAutoFit/>
+          </a:bodyPr>
+          <a:lstStyle/>
+          <a:p>
+            <a:pPr>
+              <a:buNone/>
+            </a:pPr>
+            <a:r>
+              <a:rPr lang="en-US" sz="800" dirty="0" smtClean="0">
+                <a:solidFill>
+                  <a:srgbClr val="000000"/>
+                </a:solidFill>
+              </a:rPr>
+              <a:t>Lorem ipsum dolor sit amet, iudico doming cum an, nemore posidonium constituam cu vis. Mea ei hinc nemore?</a:t>
+            </a:r>
+            <a:endParaRPr lang="en-US" dirty="0"/>
+          </a:p>
+        </p:txBody>
+      </p:sp>
+      <p:sp>
+        <p:nvSpPr>
+          <p:cNvPr id="12" name="Object 11"/>
+          <p:cNvSpPr/>
+          <p:nvPr/>
+        </p:nvSpPr>
+        <p:spPr>
+          <a:xfrm>
+            <a:off x="4572000" y="3017520"/>
+            <a:ext cx="4389120" cy="274320"/>
+          </a:xfrm>
+          <a:prstGeom prst="rect">
+            <a:avLst/>
+          </a:prstGeom>
+          <a:noFill/>
+        </p:spPr>
+        <p:txBody>
+          <a:bodyPr wrap="square" rtlCol="0" anchor="t">
+            <a:spAutoFit/>
+          </a:bodyPr>
+          <a:lstStyle/>
+          <a:p>
+            <a:pPr>
+              <a:buNone/>
+            </a:pPr>
+            <a:r>
+              <a:rPr lang="en-US" sz="800" dirty="0" smtClean="0">
+                <a:solidFill>
+                  <a:srgbClr val="000000"/>
+                </a:solidFill>
+              </a:rPr>
+              <a:t>sdsadsa</a:t>
             </a:r>
             <a:endParaRPr lang="en-US" dirty="0"/>
           </a:p>

</xml_diff>